<commit_message>
Add the money maker
Add the money maker
</commit_message>
<xml_diff>
--- a/Course Content/Mid course presentation template.pptx
+++ b/Course Content/Mid course presentation template.pptx
@@ -217,6 +217,30 @@
             <ac:picMk id="5" creationId="{5EF6FC56-4D8B-4D8B-8B50-9B5F8FE8A3F1}"/>
           </ac:picMkLst>
         </pc:picChg>
+      </pc:sldChg>
+    </pc:docChg>
+  </pc:docChgLst>
+  <pc:docChgLst>
+    <pc:chgData name="Martin Schray" userId="bf4f4853c980e97a" providerId="LiveId" clId="{75971A44-C0CD-4842-AAB4-CBBEF28CBF8A}"/>
+    <pc:docChg chg="custSel modSld">
+      <pc:chgData name="Martin Schray" userId="bf4f4853c980e97a" providerId="LiveId" clId="{75971A44-C0CD-4842-AAB4-CBBEF28CBF8A}" dt="2022-09-20T22:52:58.155" v="77" actId="20577"/>
+      <pc:docMkLst>
+        <pc:docMk/>
+      </pc:docMkLst>
+      <pc:sldChg chg="modSp mod">
+        <pc:chgData name="Martin Schray" userId="bf4f4853c980e97a" providerId="LiveId" clId="{75971A44-C0CD-4842-AAB4-CBBEF28CBF8A}" dt="2022-09-20T22:52:58.155" v="77" actId="20577"/>
+        <pc:sldMkLst>
+          <pc:docMk/>
+          <pc:sldMk cId="1211749345" sldId="261"/>
+        </pc:sldMkLst>
+        <pc:spChg chg="mod">
+          <ac:chgData name="Martin Schray" userId="bf4f4853c980e97a" providerId="LiveId" clId="{75971A44-C0CD-4842-AAB4-CBBEF28CBF8A}" dt="2022-09-20T22:52:58.155" v="77" actId="20577"/>
+          <ac:spMkLst>
+            <pc:docMk/>
+            <pc:sldMk cId="1211749345" sldId="261"/>
+            <ac:spMk id="3" creationId="{DE9F9C15-CAF4-47F0-80CC-073522E0DB3D}"/>
+          </ac:spMkLst>
+        </pc:spChg>
       </pc:sldChg>
     </pc:docChg>
   </pc:docChgLst>
@@ -3630,6 +3654,37 @@
               </a:rPr>
               <a:t>Scenario(s)</a:t>
             </a:r>
+          </a:p>
+          <a:p>
+            <a:pPr marL="685800" indent="-228600" algn="l" rtl="0" latinLnBrk="0">
+              <a:lnSpc>
+                <a:spcPct val="120000"/>
+              </a:lnSpc>
+              <a:spcBef>
+                <a:spcPts val="500"/>
+              </a:spcBef>
+              <a:spcAft>
+                <a:spcPts val="0"/>
+              </a:spcAft>
+            </a:pPr>
+            <a:r>
+              <a:rPr lang="en-US" sz="1800" cap="all" dirty="0">
+                <a:solidFill>
+                  <a:srgbClr val="000000"/>
+                </a:solidFill>
+                <a:latin typeface="Impact" panose="020B0806030902050204" pitchFamily="34" charset="0"/>
+              </a:rPr>
+              <a:t>How might you make money (subscriptions, ads, fee on </a:t>
+            </a:r>
+            <a:r>
+              <a:rPr lang="en-US" sz="1800" cap="all">
+                <a:solidFill>
+                  <a:srgbClr val="000000"/>
+                </a:solidFill>
+                <a:latin typeface="Impact" panose="020B0806030902050204" pitchFamily="34" charset="0"/>
+              </a:rPr>
+              <a:t>each sale, …)</a:t>
+            </a:r>
             <a:endParaRPr lang="en-US" dirty="0">
               <a:effectLst/>
             </a:endParaRPr>

</xml_diff>